<commit_message>
Update Notice Robot Holonome
</commit_message>
<xml_diff>
--- a/Maquettes/Elec_Num_Emb/Robot_Holonome/procedure_test_robot.pptx
+++ b/Maquettes/Elec_Num_Emb/Robot_Holonome/procedure_test_robot.pptx
@@ -206,7 +206,7 @@
           <a:p>
             <a:fld id="{A63A71F6-3B49-4358-957E-A92BEFE4DD94}" type="datetimeFigureOut">
               <a:rPr lang="fr-FR" smtClean="0"/>
-              <a:t>18/04/2023</a:t>
+              <a:t>24/04/2023</a:t>
             </a:fld>
             <a:endParaRPr lang="fr-FR"/>
           </a:p>
@@ -1727,7 +1727,7 @@
           <a:p>
             <a:fld id="{9F9D7BD0-09ED-4241-9B50-84DC221E5746}" type="datetimeFigureOut">
               <a:rPr lang="fr-FR" smtClean="0"/>
-              <a:t>18/04/2023</a:t>
+              <a:t>24/04/2023</a:t>
             </a:fld>
             <a:endParaRPr lang="fr-FR"/>
           </a:p>
@@ -1925,7 +1925,7 @@
           <a:p>
             <a:fld id="{9F9D7BD0-09ED-4241-9B50-84DC221E5746}" type="datetimeFigureOut">
               <a:rPr lang="fr-FR" smtClean="0"/>
-              <a:t>18/04/2023</a:t>
+              <a:t>24/04/2023</a:t>
             </a:fld>
             <a:endParaRPr lang="fr-FR"/>
           </a:p>
@@ -2133,7 +2133,7 @@
           <a:p>
             <a:fld id="{9F9D7BD0-09ED-4241-9B50-84DC221E5746}" type="datetimeFigureOut">
               <a:rPr lang="fr-FR" smtClean="0"/>
-              <a:t>18/04/2023</a:t>
+              <a:t>24/04/2023</a:t>
             </a:fld>
             <a:endParaRPr lang="fr-FR"/>
           </a:p>
@@ -2331,7 +2331,7 @@
           <a:p>
             <a:fld id="{9F9D7BD0-09ED-4241-9B50-84DC221E5746}" type="datetimeFigureOut">
               <a:rPr lang="fr-FR" smtClean="0"/>
-              <a:t>18/04/2023</a:t>
+              <a:t>24/04/2023</a:t>
             </a:fld>
             <a:endParaRPr lang="fr-FR"/>
           </a:p>
@@ -2606,7 +2606,7 @@
           <a:p>
             <a:fld id="{9F9D7BD0-09ED-4241-9B50-84DC221E5746}" type="datetimeFigureOut">
               <a:rPr lang="fr-FR" smtClean="0"/>
-              <a:t>18/04/2023</a:t>
+              <a:t>24/04/2023</a:t>
             </a:fld>
             <a:endParaRPr lang="fr-FR"/>
           </a:p>
@@ -2871,7 +2871,7 @@
           <a:p>
             <a:fld id="{9F9D7BD0-09ED-4241-9B50-84DC221E5746}" type="datetimeFigureOut">
               <a:rPr lang="fr-FR" smtClean="0"/>
-              <a:t>18/04/2023</a:t>
+              <a:t>24/04/2023</a:t>
             </a:fld>
             <a:endParaRPr lang="fr-FR"/>
           </a:p>
@@ -3283,7 +3283,7 @@
           <a:p>
             <a:fld id="{9F9D7BD0-09ED-4241-9B50-84DC221E5746}" type="datetimeFigureOut">
               <a:rPr lang="fr-FR" smtClean="0"/>
-              <a:t>18/04/2023</a:t>
+              <a:t>24/04/2023</a:t>
             </a:fld>
             <a:endParaRPr lang="fr-FR"/>
           </a:p>
@@ -3424,7 +3424,7 @@
           <a:p>
             <a:fld id="{9F9D7BD0-09ED-4241-9B50-84DC221E5746}" type="datetimeFigureOut">
               <a:rPr lang="fr-FR" smtClean="0"/>
-              <a:t>18/04/2023</a:t>
+              <a:t>24/04/2023</a:t>
             </a:fld>
             <a:endParaRPr lang="fr-FR"/>
           </a:p>
@@ -3537,7 +3537,7 @@
           <a:p>
             <a:fld id="{9F9D7BD0-09ED-4241-9B50-84DC221E5746}" type="datetimeFigureOut">
               <a:rPr lang="fr-FR" smtClean="0"/>
-              <a:t>18/04/2023</a:t>
+              <a:t>24/04/2023</a:t>
             </a:fld>
             <a:endParaRPr lang="fr-FR"/>
           </a:p>
@@ -3848,7 +3848,7 @@
           <a:p>
             <a:fld id="{9F9D7BD0-09ED-4241-9B50-84DC221E5746}" type="datetimeFigureOut">
               <a:rPr lang="fr-FR" smtClean="0"/>
-              <a:t>18/04/2023</a:t>
+              <a:t>24/04/2023</a:t>
             </a:fld>
             <a:endParaRPr lang="fr-FR"/>
           </a:p>
@@ -4136,7 +4136,7 @@
           <a:p>
             <a:fld id="{9F9D7BD0-09ED-4241-9B50-84DC221E5746}" type="datetimeFigureOut">
               <a:rPr lang="fr-FR" smtClean="0"/>
-              <a:t>18/04/2023</a:t>
+              <a:t>24/04/2023</a:t>
             </a:fld>
             <a:endParaRPr lang="fr-FR"/>
           </a:p>
@@ -4377,7 +4377,7 @@
           <a:p>
             <a:fld id="{9F9D7BD0-09ED-4241-9B50-84DC221E5746}" type="datetimeFigureOut">
               <a:rPr lang="fr-FR" smtClean="0"/>
-              <a:t>18/04/2023</a:t>
+              <a:t>24/04/2023</a:t>
             </a:fld>
             <a:endParaRPr lang="fr-FR"/>
           </a:p>
@@ -9598,6 +9598,50 @@
           </a:p>
         </p:txBody>
       </p:sp>
+      <p:sp>
+        <p:nvSpPr>
+          <p:cNvPr id="2" name="ZoneTexte 1">
+            <a:extLst>
+              <a:ext uri="{FF2B5EF4-FFF2-40B4-BE49-F238E27FC236}">
+                <a16:creationId xmlns:a16="http://schemas.microsoft.com/office/drawing/2014/main" id="{AFC5C783-C09D-97CB-A553-6A715748BA67}"/>
+              </a:ext>
+            </a:extLst>
+          </p:cNvPr>
+          <p:cNvSpPr txBox="1"/>
+          <p:nvPr/>
+        </p:nvSpPr>
+        <p:spPr>
+          <a:xfrm>
+            <a:off x="8313682" y="173160"/>
+            <a:ext cx="3338991" cy="461665"/>
+          </a:xfrm>
+          <a:prstGeom prst="rect">
+            <a:avLst/>
+          </a:prstGeom>
+          <a:noFill/>
+        </p:spPr>
+        <p:txBody>
+          <a:bodyPr wrap="none" rtlCol="0">
+            <a:spAutoFit/>
+          </a:bodyPr>
+          <a:lstStyle/>
+          <a:p>
+            <a:r>
+              <a:rPr lang="fr-FR" sz="2400" b="1" i="1" dirty="0">
+                <a:solidFill>
+                  <a:schemeClr val="accent6">
+                    <a:lumMod val="75000"/>
+                  </a:schemeClr>
+                </a:solidFill>
+                <a:latin typeface="Arial" panose="020B0604020202020204" pitchFamily="34" charset="0"/>
+                <a:ea typeface="Microsoft JhengHei" panose="020B0604030504040204" pitchFamily="34" charset="-120"/>
+                <a:cs typeface="Arial" panose="020B0604020202020204" pitchFamily="34" charset="0"/>
+              </a:rPr>
+              <a:t>NOTICE UTILISATION</a:t>
+            </a:r>
+          </a:p>
+        </p:txBody>
+      </p:sp>
     </p:spTree>
     <p:extLst>
       <p:ext uri="{BB962C8B-B14F-4D97-AF65-F5344CB8AC3E}">
@@ -11075,8 +11119,8 @@
           </a:p>
         </p:txBody>
       </p:sp>
-      <mc:AlternateContent xmlns:mc="http://schemas.openxmlformats.org/markup-compatibility/2006">
-        <mc:Choice xmlns:a14="http://schemas.microsoft.com/office/drawing/2010/main" Requires="a14">
+      <mc:AlternateContent xmlns:mc="http://schemas.openxmlformats.org/markup-compatibility/2006" xmlns:a14="http://schemas.microsoft.com/office/drawing/2010/main">
+        <mc:Choice Requires="a14">
           <p:sp>
             <p:nvSpPr>
               <p:cNvPr id="11" name="ZoneTexte 10">
@@ -11193,7 +11237,7 @@
             </p:txBody>
           </p:sp>
         </mc:Choice>
-        <mc:Fallback>
+        <mc:Fallback xmlns="">
           <p:sp>
             <p:nvSpPr>
               <p:cNvPr id="11" name="ZoneTexte 10">
@@ -11513,8 +11557,8 @@
           </a:fontRef>
         </p:style>
       </p:cxnSp>
-      <mc:AlternateContent xmlns:mc="http://schemas.openxmlformats.org/markup-compatibility/2006">
-        <mc:Choice xmlns:a14="http://schemas.microsoft.com/office/drawing/2010/main" Requires="a14">
+      <mc:AlternateContent xmlns:mc="http://schemas.openxmlformats.org/markup-compatibility/2006" xmlns:a14="http://schemas.microsoft.com/office/drawing/2010/main">
+        <mc:Choice Requires="a14">
           <p:sp>
             <p:nvSpPr>
               <p:cNvPr id="37" name="ZoneTexte 36">
@@ -11596,7 +11640,7 @@
             </p:txBody>
           </p:sp>
         </mc:Choice>
-        <mc:Fallback>
+        <mc:Fallback xmlns="">
           <p:sp>
             <p:nvSpPr>
               <p:cNvPr id="37" name="ZoneTexte 36">
@@ -11747,8 +11791,8 @@
           </a:fontRef>
         </p:style>
       </p:cxnSp>
-      <mc:AlternateContent xmlns:mc="http://schemas.openxmlformats.org/markup-compatibility/2006">
-        <mc:Choice xmlns:a14="http://schemas.microsoft.com/office/drawing/2010/main" Requires="a14">
+      <mc:AlternateContent xmlns:mc="http://schemas.openxmlformats.org/markup-compatibility/2006" xmlns:a14="http://schemas.microsoft.com/office/drawing/2010/main">
+        <mc:Choice Requires="a14">
           <p:sp>
             <p:nvSpPr>
               <p:cNvPr id="44" name="ZoneTexte 43">
@@ -11806,7 +11850,7 @@
             </p:txBody>
           </p:sp>
         </mc:Choice>
-        <mc:Fallback>
+        <mc:Fallback xmlns="">
           <p:sp>
             <p:nvSpPr>
               <p:cNvPr id="44" name="ZoneTexte 43">
@@ -11890,8 +11934,8 @@
           <a:fontRef idx="minor"/>
         </p:style>
       </p:sp>
-      <mc:AlternateContent xmlns:mc="http://schemas.openxmlformats.org/markup-compatibility/2006">
-        <mc:Choice xmlns:a14="http://schemas.microsoft.com/office/drawing/2010/main" Requires="a14">
+      <mc:AlternateContent xmlns:mc="http://schemas.openxmlformats.org/markup-compatibility/2006" xmlns:a14="http://schemas.microsoft.com/office/drawing/2010/main">
+        <mc:Choice Requires="a14">
           <p:sp>
             <p:nvSpPr>
               <p:cNvPr id="47" name="ZoneTexte 46">
@@ -11920,7 +11964,6 @@
               </a:bodyPr>
               <a:lstStyle/>
               <a:p>
-                <a:pPr/>
                 <a14:m>
                   <m:oMath xmlns:m="http://schemas.openxmlformats.org/officeDocument/2006/math">
                     <m:r>
@@ -11953,7 +11996,7 @@
             </p:txBody>
           </p:sp>
         </mc:Choice>
-        <mc:Fallback>
+        <mc:Fallback xmlns="">
           <p:sp>
             <p:nvSpPr>
               <p:cNvPr id="47" name="ZoneTexte 46">
@@ -12042,8 +12085,8 @@
           </a:fontRef>
         </p:style>
       </p:cxnSp>
-      <mc:AlternateContent xmlns:mc="http://schemas.openxmlformats.org/markup-compatibility/2006">
-        <mc:Choice xmlns:a14="http://schemas.microsoft.com/office/drawing/2010/main" Requires="a14">
+      <mc:AlternateContent xmlns:mc="http://schemas.openxmlformats.org/markup-compatibility/2006" xmlns:a14="http://schemas.microsoft.com/office/drawing/2010/main">
+        <mc:Choice Requires="a14">
           <p:sp>
             <p:nvSpPr>
               <p:cNvPr id="59" name="ZoneTexte 58">
@@ -12125,7 +12168,7 @@
             </p:txBody>
           </p:sp>
         </mc:Choice>
-        <mc:Fallback>
+        <mc:Fallback xmlns="">
           <p:sp>
             <p:nvSpPr>
               <p:cNvPr id="59" name="ZoneTexte 58">
@@ -12270,7 +12313,6 @@
           </a:bodyPr>
           <a:lstStyle/>
           <a:p>
-            <a:pPr/>
             <a:r>
               <a:rPr lang="fr-FR" sz="1600" dirty="0">
                 <a:solidFill>
@@ -12623,7 +12665,6 @@
           </a:bodyPr>
           <a:lstStyle/>
           <a:p>
-            <a:pPr/>
             <a:r>
               <a:rPr lang="fr-FR" sz="1600" dirty="0">
                 <a:solidFill>
@@ -13262,7 +13303,6 @@
           </a:bodyPr>
           <a:lstStyle/>
           <a:p>
-            <a:pPr/>
             <a:r>
               <a:rPr lang="fr-FR" sz="1600" dirty="0">
                 <a:solidFill>
@@ -13335,7 +13375,6 @@
           </a:bodyPr>
           <a:lstStyle/>
           <a:p>
-            <a:pPr/>
             <a:r>
               <a:rPr lang="fr-FR" sz="1200" i="1" dirty="0">
                 <a:solidFill>
@@ -14642,6 +14681,54 @@
             <a:endParaRPr lang="fr-FR" sz="2000" b="0" strike="noStrike" spc="-1" dirty="0">
               <a:latin typeface="Arial"/>
             </a:endParaRPr>
+          </a:p>
+        </p:txBody>
+      </p:sp>
+      <p:sp>
+        <p:nvSpPr>
+          <p:cNvPr id="4" name="ZoneTexte 3">
+            <a:extLst>
+              <a:ext uri="{FF2B5EF4-FFF2-40B4-BE49-F238E27FC236}">
+                <a16:creationId xmlns:a16="http://schemas.microsoft.com/office/drawing/2014/main" id="{7ECF2D08-FB2A-C152-625D-F6FE76FF62AD}"/>
+              </a:ext>
+            </a:extLst>
+          </p:cNvPr>
+          <p:cNvSpPr txBox="1"/>
+          <p:nvPr/>
+        </p:nvSpPr>
+        <p:spPr>
+          <a:xfrm>
+            <a:off x="4917990" y="6411358"/>
+            <a:ext cx="6816979" cy="276999"/>
+          </a:xfrm>
+          <a:prstGeom prst="rect">
+            <a:avLst/>
+          </a:prstGeom>
+          <a:solidFill>
+            <a:schemeClr val="accent1">
+              <a:lumMod val="60000"/>
+              <a:lumOff val="40000"/>
+            </a:schemeClr>
+          </a:solidFill>
+        </p:spPr>
+        <p:txBody>
+          <a:bodyPr wrap="square">
+            <a:spAutoFit/>
+          </a:bodyPr>
+          <a:lstStyle/>
+          <a:p>
+            <a:r>
+              <a:rPr lang="fr-FR" sz="1200" dirty="0">
+                <a:highlight>
+                  <a:srgbClr val="00FFFF"/>
+                </a:highlight>
+              </a:rPr>
+              <a:t>NUCLEO</a:t>
+            </a:r>
+            <a:r>
+              <a:rPr lang="fr-FR" sz="1200" dirty="0"/>
+              <a:t>  http://lense.institutoptique.fr/mine/nucleo-faire-varier-la-vitesse-dun-moteur-a-courant-continu/</a:t>
+            </a:r>
           </a:p>
         </p:txBody>
       </p:sp>
@@ -15174,6 +15261,50 @@
           </a:p>
         </p:txBody>
       </p:sp>
+      <p:sp>
+        <p:nvSpPr>
+          <p:cNvPr id="2" name="ZoneTexte 1">
+            <a:extLst>
+              <a:ext uri="{FF2B5EF4-FFF2-40B4-BE49-F238E27FC236}">
+                <a16:creationId xmlns:a16="http://schemas.microsoft.com/office/drawing/2014/main" id="{3B0C2F27-B694-5D38-2CB4-CA2E78E2BB16}"/>
+              </a:ext>
+            </a:extLst>
+          </p:cNvPr>
+          <p:cNvSpPr txBox="1"/>
+          <p:nvPr/>
+        </p:nvSpPr>
+        <p:spPr>
+          <a:xfrm>
+            <a:off x="8313682" y="173160"/>
+            <a:ext cx="3338991" cy="461665"/>
+          </a:xfrm>
+          <a:prstGeom prst="rect">
+            <a:avLst/>
+          </a:prstGeom>
+          <a:noFill/>
+        </p:spPr>
+        <p:txBody>
+          <a:bodyPr wrap="none" rtlCol="0">
+            <a:spAutoFit/>
+          </a:bodyPr>
+          <a:lstStyle/>
+          <a:p>
+            <a:r>
+              <a:rPr lang="fr-FR" sz="2400" b="1" i="1" dirty="0">
+                <a:solidFill>
+                  <a:schemeClr val="accent6">
+                    <a:lumMod val="75000"/>
+                  </a:schemeClr>
+                </a:solidFill>
+                <a:latin typeface="Arial" panose="020B0604020202020204" pitchFamily="34" charset="0"/>
+                <a:ea typeface="Microsoft JhengHei" panose="020B0604030504040204" pitchFamily="34" charset="-120"/>
+                <a:cs typeface="Arial" panose="020B0604020202020204" pitchFamily="34" charset="0"/>
+              </a:rPr>
+              <a:t>NOTICE UTILISATION</a:t>
+            </a:r>
+          </a:p>
+        </p:txBody>
+      </p:sp>
     </p:spTree>
     <p:extLst>
       <p:ext uri="{BB962C8B-B14F-4D97-AF65-F5344CB8AC3E}">
@@ -15548,7 +15679,6 @@
           </a:bodyPr>
           <a:lstStyle/>
           <a:p>
-            <a:pPr/>
             <a:r>
               <a:rPr lang="fr-FR" sz="1600" dirty="0">
                 <a:solidFill>
@@ -15668,7 +15798,6 @@
           </a:bodyPr>
           <a:lstStyle/>
           <a:p>
-            <a:pPr/>
             <a:r>
               <a:rPr lang="fr-FR" sz="1600" b="1" dirty="0">
                 <a:solidFill>
@@ -15870,6 +15999,78 @@
       </p:grpSpPr>
       <p:sp>
         <p:nvSpPr>
+          <p:cNvPr id="8" name="ZoneTexte 7">
+            <a:extLst>
+              <a:ext uri="{FF2B5EF4-FFF2-40B4-BE49-F238E27FC236}">
+                <a16:creationId xmlns:a16="http://schemas.microsoft.com/office/drawing/2014/main" id="{330910C3-9066-629D-0D40-17B6CF8B9940}"/>
+              </a:ext>
+            </a:extLst>
+          </p:cNvPr>
+          <p:cNvSpPr txBox="1"/>
+          <p:nvPr/>
+        </p:nvSpPr>
+        <p:spPr>
+          <a:xfrm>
+            <a:off x="6857917" y="1907084"/>
+            <a:ext cx="4877056" cy="338554"/>
+          </a:xfrm>
+          <a:prstGeom prst="rect">
+            <a:avLst/>
+          </a:prstGeom>
+          <a:noFill/>
+        </p:spPr>
+        <p:txBody>
+          <a:bodyPr wrap="square">
+            <a:spAutoFit/>
+          </a:bodyPr>
+          <a:lstStyle/>
+          <a:p>
+            <a:r>
+              <a:rPr lang="fr-FR" sz="1600" dirty="0">
+                <a:solidFill>
+                  <a:schemeClr val="tx1">
+                    <a:lumMod val="65000"/>
+                    <a:lumOff val="35000"/>
+                  </a:schemeClr>
+                </a:solidFill>
+              </a:rPr>
+              <a:t>Les deux bornes du cavalier </a:t>
+            </a:r>
+            <a:r>
+              <a:rPr lang="fr-FR" sz="1600" b="1" dirty="0">
+                <a:solidFill>
+                  <a:schemeClr val="tx1">
+                    <a:lumMod val="65000"/>
+                    <a:lumOff val="35000"/>
+                  </a:schemeClr>
+                </a:solidFill>
+              </a:rPr>
+              <a:t>J19</a:t>
+            </a:r>
+            <a:r>
+              <a:rPr lang="fr-FR" sz="1600" dirty="0">
+                <a:solidFill>
+                  <a:schemeClr val="tx1">
+                    <a:lumMod val="65000"/>
+                    <a:lumOff val="35000"/>
+                  </a:schemeClr>
+                </a:solidFill>
+              </a:rPr>
+              <a:t> doivent être reliées.</a:t>
+            </a:r>
+            <a:endParaRPr lang="fr-FR" sz="1600" b="1" i="1" dirty="0">
+              <a:solidFill>
+                <a:schemeClr val="tx1">
+                  <a:lumMod val="65000"/>
+                  <a:lumOff val="35000"/>
+                </a:schemeClr>
+              </a:solidFill>
+            </a:endParaRPr>
+          </a:p>
+        </p:txBody>
+      </p:sp>
+      <p:sp>
+        <p:nvSpPr>
           <p:cNvPr id="48" name="CustomShape 1"/>
           <p:cNvSpPr/>
           <p:nvPr/>
@@ -17181,6 +17382,48 @@
           <a:p>
             <a:pPr algn="ctr"/>
             <a:endParaRPr lang="fr-FR"/>
+          </a:p>
+        </p:txBody>
+      </p:sp>
+      <p:sp>
+        <p:nvSpPr>
+          <p:cNvPr id="5" name="ZoneTexte 4">
+            <a:extLst>
+              <a:ext uri="{FF2B5EF4-FFF2-40B4-BE49-F238E27FC236}">
+                <a16:creationId xmlns:a16="http://schemas.microsoft.com/office/drawing/2014/main" id="{3622B20F-F35C-0332-5F81-80B3BE12F1C3}"/>
+              </a:ext>
+            </a:extLst>
+          </p:cNvPr>
+          <p:cNvSpPr txBox="1"/>
+          <p:nvPr/>
+        </p:nvSpPr>
+        <p:spPr>
+          <a:xfrm rot="20495777">
+            <a:off x="8175566" y="3448668"/>
+            <a:ext cx="2241755" cy="369332"/>
+          </a:xfrm>
+          <a:prstGeom prst="rect">
+            <a:avLst/>
+          </a:prstGeom>
+          <a:noFill/>
+        </p:spPr>
+        <p:txBody>
+          <a:bodyPr wrap="square" rtlCol="0">
+            <a:spAutoFit/>
+          </a:bodyPr>
+          <a:lstStyle/>
+          <a:p>
+            <a:pPr algn="ctr"/>
+            <a:r>
+              <a:rPr lang="fr-FR" dirty="0">
+                <a:solidFill>
+                  <a:schemeClr val="bg1">
+                    <a:lumMod val="50000"/>
+                  </a:schemeClr>
+                </a:solidFill>
+              </a:rPr>
+              <a:t>PHOTO CARTE</a:t>
+            </a:r>
           </a:p>
         </p:txBody>
       </p:sp>

</xml_diff>